<commit_message>
fixed typo in L8.2
</commit_message>
<xml_diff>
--- a/Slides/Lesson 8.2 Binary Search.pptx
+++ b/Slides/Lesson 8.2 Binary Search.pptx
@@ -259,7 +259,7 @@
             <a:fld id="{CF8F25F6-E1EF-4065-8525-42EDEBD9BD22}" type="datetimeFigureOut">
               <a:rPr lang="en-US" smtClean="0"/>
               <a:pPr/>
-              <a:t>10/22/2017</a:t>
+              <a:t>11/1/2017</a:t>
             </a:fld>
             <a:endParaRPr lang="en-US"/>
           </a:p>
@@ -965,7 +965,7 @@
           <a:p>
             <a:fld id="{2F1F79F5-7BEC-496A-AFC7-876E38F64D71}" type="datetime1">
               <a:rPr lang="en-US" smtClean="0"/>
-              <a:t>10/22/2017</a:t>
+              <a:t>11/1/2017</a:t>
             </a:fld>
             <a:endParaRPr lang="en-US"/>
           </a:p>
@@ -1060,7 +1060,7 @@
           <a:p>
             <a:fld id="{0A05703A-7669-4FEA-9056-25299B4D29D4}" type="datetime1">
               <a:rPr lang="en-US" smtClean="0"/>
-              <a:t>10/22/2017</a:t>
+              <a:t>11/1/2017</a:t>
             </a:fld>
             <a:endParaRPr lang="en-US"/>
           </a:p>
@@ -1335,7 +1335,7 @@
           <a:p>
             <a:fld id="{6E5077B5-BB57-49DB-88CA-226A139E5C01}" type="datetime1">
               <a:rPr lang="en-US" smtClean="0"/>
-              <a:t>10/22/2017</a:t>
+              <a:t>11/1/2017</a:t>
             </a:fld>
             <a:endParaRPr lang="en-US"/>
           </a:p>
@@ -1587,7 +1587,7 @@
           <a:p>
             <a:fld id="{C48D9447-CBD6-49A1-89FD-8512A8CF8999}" type="datetime1">
               <a:rPr lang="en-US" smtClean="0"/>
-              <a:t>10/22/2017</a:t>
+              <a:t>11/1/2017</a:t>
             </a:fld>
             <a:endParaRPr lang="en-US"/>
           </a:p>
@@ -1755,7 +1755,7 @@
           <a:p>
             <a:fld id="{A3639A2A-823D-48B7-9ACE-7FAF42870BA9}" type="datetime1">
               <a:rPr lang="en-US" smtClean="0"/>
-              <a:t>10/22/2017</a:t>
+              <a:t>11/1/2017</a:t>
             </a:fld>
             <a:endParaRPr lang="en-US"/>
           </a:p>
@@ -1933,7 +1933,7 @@
           <a:p>
             <a:fld id="{ED1B6996-82E9-463C-972C-7B56056E426C}" type="datetime1">
               <a:rPr lang="en-US" smtClean="0"/>
-              <a:t>10/22/2017</a:t>
+              <a:t>11/1/2017</a:t>
             </a:fld>
             <a:endParaRPr lang="en-US"/>
           </a:p>
@@ -2107,7 +2107,7 @@
           <a:p>
             <a:fld id="{E22ED4DA-448D-4BB1-B935-CC112220207B}" type="datetime1">
               <a:rPr lang="en-US" smtClean="0"/>
-              <a:t>10/22/2017</a:t>
+              <a:t>11/1/2017</a:t>
             </a:fld>
             <a:endParaRPr lang="en-US"/>
           </a:p>
@@ -2280,7 +2280,7 @@
           <a:p>
             <a:fld id="{E22ED4DA-448D-4BB1-B935-CC112220207B}" type="datetime1">
               <a:rPr lang="en-US" smtClean="0"/>
-              <a:t>10/22/2017</a:t>
+              <a:t>11/1/2017</a:t>
             </a:fld>
             <a:endParaRPr lang="en-US"/>
           </a:p>
@@ -2540,7 +2540,7 @@
           <a:p>
             <a:fld id="{FF5D65A6-AB94-4435-B0B7-3743215FA46C}" type="datetime1">
               <a:rPr lang="en-US" smtClean="0"/>
-              <a:t>10/22/2017</a:t>
+              <a:t>11/1/2017</a:t>
             </a:fld>
             <a:endParaRPr lang="en-US"/>
           </a:p>
@@ -2716,7 +2716,7 @@
           <a:p>
             <a:fld id="{FF5D65A6-AB94-4435-B0B7-3743215FA46C}" type="datetime1">
               <a:rPr lang="en-US" smtClean="0"/>
-              <a:t>10/22/2017</a:t>
+              <a:t>11/1/2017</a:t>
             </a:fld>
             <a:endParaRPr lang="en-US"/>
           </a:p>
@@ -3010,7 +3010,7 @@
           <a:p>
             <a:fld id="{7C193DC4-6EF0-48C9-B29C-616106A645E1}" type="datetime1">
               <a:rPr lang="en-US" smtClean="0"/>
-              <a:t>10/22/2017</a:t>
+              <a:t>11/1/2017</a:t>
             </a:fld>
             <a:endParaRPr lang="en-US"/>
           </a:p>
@@ -3295,7 +3295,7 @@
           <a:p>
             <a:fld id="{5D1846AD-9252-4647-9435-4C2AC365653A}" type="datetime1">
               <a:rPr lang="en-US" smtClean="0"/>
-              <a:t>10/22/2017</a:t>
+              <a:t>11/1/2017</a:t>
             </a:fld>
             <a:endParaRPr lang="en-US"/>
           </a:p>
@@ -3714,7 +3714,7 @@
           <a:p>
             <a:fld id="{CE56DC10-3561-4063-A6AF-C1CC7A41040A}" type="datetime1">
               <a:rPr lang="en-US" smtClean="0"/>
-              <a:t>10/22/2017</a:t>
+              <a:t>11/1/2017</a:t>
             </a:fld>
             <a:endParaRPr lang="en-US"/>
           </a:p>
@@ -3831,7 +3831,7 @@
           <a:p>
             <a:fld id="{2F7B77F5-1464-4F6B-92A8-64FC8A508293}" type="datetime1">
               <a:rPr lang="en-US" smtClean="0"/>
-              <a:t>10/22/2017</a:t>
+              <a:t>11/1/2017</a:t>
             </a:fld>
             <a:endParaRPr lang="en-US"/>
           </a:p>
@@ -4054,7 +4054,7 @@
           <a:p>
             <a:fld id="{02B3F677-983B-48DB-ADFD-63FE6CBC7FB2}" type="datetime1">
               <a:rPr lang="en-US" smtClean="0"/>
-              <a:t>10/22/2017</a:t>
+              <a:t>11/1/2017</a:t>
             </a:fld>
             <a:endParaRPr lang="en-US"/>
           </a:p>
@@ -14209,7 +14209,15 @@
           <a:p>
             <a:r>
               <a:rPr lang="en-US" dirty="0"/>
-              <a:t>Study the file 08-2-binary-search.rkt in the Examples folder</a:t>
+              <a:t>Study the file </a:t>
+            </a:r>
+            <a:r>
+              <a:rPr lang="en-US"/>
+              <a:t>08-2-binary-search.java </a:t>
+            </a:r>
+            <a:r>
+              <a:rPr lang="en-US" dirty="0"/>
+              <a:t>in the Examples folder</a:t>
             </a:r>
           </a:p>
           <a:p>

</xml_diff>